<commit_message>
Presentation updates and EC2
</commit_message>
<xml_diff>
--- a/Presentations/KNITS/Programs/Trainings/KNITS-YOUnicorn.pptx
+++ b/Presentations/KNITS/Programs/Trainings/KNITS-YOUnicorn.pptx
@@ -1686,7 +1686,7 @@
           <p:cNvPr id="3" name="Group 2">
             <a:extLst>
               <a:ext uri="{FF2B5EF4-FFF2-40B4-BE49-F238E27FC236}">
-                <a16:creationId xmlns:a16="http://schemas.microsoft.com/office/drawing/2014/main" xmlns="" id="{AEDF2B47-7C58-458B-A014-B081B81A8D06}"/>
+                <a16:creationId xmlns="" xmlns:a16="http://schemas.microsoft.com/office/drawing/2014/main" id="{AEDF2B47-7C58-458B-A014-B081B81A8D06}"/>
               </a:ext>
             </a:extLst>
           </p:cNvPr>
@@ -1706,7 +1706,7 @@
             <p:cNvPr id="4" name="Rectangle: Folded Corner 3">
               <a:extLst>
                 <a:ext uri="{FF2B5EF4-FFF2-40B4-BE49-F238E27FC236}">
-                  <a16:creationId xmlns:a16="http://schemas.microsoft.com/office/drawing/2014/main" xmlns="" id="{C7ACA455-4437-4416-A6F0-33D534A6AE9F}"/>
+                  <a16:creationId xmlns="" xmlns:a16="http://schemas.microsoft.com/office/drawing/2014/main" id="{C7ACA455-4437-4416-A6F0-33D534A6AE9F}"/>
                 </a:ext>
               </a:extLst>
             </p:cNvPr>
@@ -1832,7 +1832,7 @@
             <p:cNvPr id="5" name="Picture 4">
               <a:extLst>
                 <a:ext uri="{FF2B5EF4-FFF2-40B4-BE49-F238E27FC236}">
-                  <a16:creationId xmlns:a16="http://schemas.microsoft.com/office/drawing/2014/main" xmlns="" id="{7180DD64-6AC6-41B8-826F-6BE55763C657}"/>
+                  <a16:creationId xmlns="" xmlns:a16="http://schemas.microsoft.com/office/drawing/2014/main" id="{7180DD64-6AC6-41B8-826F-6BE55763C657}"/>
                 </a:ext>
               </a:extLst>
             </p:cNvPr>
@@ -8717,7 +8717,7 @@
           <p:cNvPr id="3" name="Shape">
             <a:extLst>
               <a:ext uri="{FF2B5EF4-FFF2-40B4-BE49-F238E27FC236}">
-                <a16:creationId xmlns:a16="http://schemas.microsoft.com/office/drawing/2014/main" xmlns="" id="{6FF3E93E-ABDF-47DC-BA17-584B968278EF}"/>
+                <a16:creationId xmlns="" xmlns:a16="http://schemas.microsoft.com/office/drawing/2014/main" id="{6FF3E93E-ABDF-47DC-BA17-584B968278EF}"/>
               </a:ext>
             </a:extLst>
           </p:cNvPr>
@@ -9237,7 +9237,7 @@
           <p:cNvPr id="4" name="Shape">
             <a:extLst>
               <a:ext uri="{FF2B5EF4-FFF2-40B4-BE49-F238E27FC236}">
-                <a16:creationId xmlns:a16="http://schemas.microsoft.com/office/drawing/2014/main" xmlns="" id="{D6709206-8CA6-4D54-B14F-541B1D07D954}"/>
+                <a16:creationId xmlns="" xmlns:a16="http://schemas.microsoft.com/office/drawing/2014/main" id="{D6709206-8CA6-4D54-B14F-541B1D07D954}"/>
               </a:ext>
             </a:extLst>
           </p:cNvPr>
@@ -9456,7 +9456,7 @@
           <p:cNvPr id="5" name="Shape">
             <a:extLst>
               <a:ext uri="{FF2B5EF4-FFF2-40B4-BE49-F238E27FC236}">
-                <a16:creationId xmlns:a16="http://schemas.microsoft.com/office/drawing/2014/main" xmlns="" id="{8E240BCB-217E-4ABA-A4CD-16814E8C3268}"/>
+                <a16:creationId xmlns="" xmlns:a16="http://schemas.microsoft.com/office/drawing/2014/main" id="{8E240BCB-217E-4ABA-A4CD-16814E8C3268}"/>
               </a:ext>
             </a:extLst>
           </p:cNvPr>
@@ -9675,7 +9675,7 @@
           <p:cNvPr id="19" name="TextBox 18">
             <a:extLst>
               <a:ext uri="{FF2B5EF4-FFF2-40B4-BE49-F238E27FC236}">
-                <a16:creationId xmlns:a16="http://schemas.microsoft.com/office/drawing/2014/main" xmlns="" id="{A8EF595E-F364-4CAC-B8F1-29033B574185}"/>
+                <a16:creationId xmlns="" xmlns:a16="http://schemas.microsoft.com/office/drawing/2014/main" id="{A8EF595E-F364-4CAC-B8F1-29033B574185}"/>
               </a:ext>
             </a:extLst>
           </p:cNvPr>
@@ -9720,7 +9720,7 @@
           <p:cNvPr id="50" name="Graphic 24" descr="Trophy">
             <a:extLst>
               <a:ext uri="{FF2B5EF4-FFF2-40B4-BE49-F238E27FC236}">
-                <a16:creationId xmlns:a16="http://schemas.microsoft.com/office/drawing/2014/main" xmlns="" id="{CB3D3DDF-9323-478E-8A36-1AE0D32355D4}"/>
+                <a16:creationId xmlns="" xmlns:a16="http://schemas.microsoft.com/office/drawing/2014/main" id="{CB3D3DDF-9323-478E-8A36-1AE0D32355D4}"/>
               </a:ext>
             </a:extLst>
           </p:cNvPr>
@@ -12074,16 +12074,14 @@
           </a:lstStyle>
           <a:p>
             <a:r>
-              <a:rPr lang="et-EE" dirty="0" smtClean="0">
+              <a:rPr lang="en-US" dirty="0" smtClean="0">
                 <a:solidFill>
                   <a:srgbClr val="435A72"/>
                 </a:solidFill>
                 <a:latin typeface="Raleway SemiBold" charset="0"/>
               </a:rPr>
-              <a:t>Show your product and your code to your next job interview</a:t>
+              <a:t>Your product is LIVE!</a:t>
             </a:r>
-          </a:p>
-          <a:p>
             <a:endParaRPr lang="et-EE" dirty="0" smtClean="0">
               <a:solidFill>
                 <a:srgbClr val="3EB1D5"/>
@@ -12739,7 +12737,7 @@
           <p:cNvPr id="60" name="TextBox 59">
             <a:extLst>
               <a:ext uri="{FF2B5EF4-FFF2-40B4-BE49-F238E27FC236}">
-                <a16:creationId xmlns:a16="http://schemas.microsoft.com/office/drawing/2014/main" xmlns="" id="{A8EF595E-F364-4CAC-B8F1-29033B574185}"/>
+                <a16:creationId xmlns="" xmlns:a16="http://schemas.microsoft.com/office/drawing/2014/main" id="{A8EF595E-F364-4CAC-B8F1-29033B574185}"/>
               </a:ext>
             </a:extLst>
           </p:cNvPr>
@@ -12855,7 +12853,7 @@
           <p:cNvPr id="26" name="TextBox 25">
             <a:extLst>
               <a:ext uri="{FF2B5EF4-FFF2-40B4-BE49-F238E27FC236}">
-                <a16:creationId xmlns:a16="http://schemas.microsoft.com/office/drawing/2014/main" xmlns="" id="{A8EF595E-F364-4CAC-B8F1-29033B574185}"/>
+                <a16:creationId xmlns="" xmlns:a16="http://schemas.microsoft.com/office/drawing/2014/main" id="{A8EF595E-F364-4CAC-B8F1-29033B574185}"/>
               </a:ext>
             </a:extLst>
           </p:cNvPr>
@@ -12907,7 +12905,7 @@
           <p:cNvPr id="27" name="TextBox 26">
             <a:extLst>
               <a:ext uri="{FF2B5EF4-FFF2-40B4-BE49-F238E27FC236}">
-                <a16:creationId xmlns:a16="http://schemas.microsoft.com/office/drawing/2014/main" xmlns="" id="{A8EF595E-F364-4CAC-B8F1-29033B574185}"/>
+                <a16:creationId xmlns="" xmlns:a16="http://schemas.microsoft.com/office/drawing/2014/main" id="{A8EF595E-F364-4CAC-B8F1-29033B574185}"/>
               </a:ext>
             </a:extLst>
           </p:cNvPr>

</xml_diff>